<commit_message>
Add slide Fix sequence diagrams
</commit_message>
<xml_diff>
--- a/mpp-cs401/src/midterm/demo/Presentation.pptx
+++ b/mpp-cs401/src/midterm/demo/Presentation.pptx
@@ -12,6 +12,7 @@
     <p:sldId id="260" r:id="rId6"/>
     <p:sldId id="261" r:id="rId7"/>
     <p:sldId id="262" r:id="rId8"/>
+    <p:sldId id="263" r:id="rId9"/>
   </p:sldIdLst>
   <p:sldSz cx="12192000" cy="6858000"/>
   <p:notesSz cx="6858000" cy="9144000"/>
@@ -3730,7 +3731,7 @@
       </p:grpSpPr>
       <p:sp useBgFill="1">
         <p:nvSpPr>
-          <p:cNvPr id="9" name="Rectangle 8">
+          <p:cNvPr id="21" name="Rectangle 20">
             <a:extLst>
               <a:ext uri="{FF2B5EF4-FFF2-40B4-BE49-F238E27FC236}">
                 <a16:creationId xmlns:a16="http://schemas.microsoft.com/office/drawing/2014/main" id="{4AA13AD3-0A4F-475A-BEBB-DEEFF5C096C3}"/>
@@ -3790,7 +3791,1486 @@
       </p:sp>
       <p:sp>
         <p:nvSpPr>
-          <p:cNvPr id="11" name="Rectangle 10">
+          <p:cNvPr id="22" name="Rectangle 21">
+            <a:extLst>
+              <a:ext uri="{FF2B5EF4-FFF2-40B4-BE49-F238E27FC236}">
+                <a16:creationId xmlns:a16="http://schemas.microsoft.com/office/drawing/2014/main" id="{4AB109E1-45E3-4986-9663-C3EAAC041219}"/>
+              </a:ext>
+              <a:ext uri="{C183D7F6-B498-43B3-948B-1728B52AA6E4}">
+                <adec:decorative xmlns:adec="http://schemas.microsoft.com/office/drawing/2017/decorative" val="1"/>
+              </a:ext>
+            </a:extLst>
+          </p:cNvPr>
+          <p:cNvSpPr>
+            <a:spLocks noGrp="1" noRot="1" noChangeAspect="1" noMove="1" noResize="1" noEditPoints="1" noAdjustHandles="1" noChangeArrowheads="1" noChangeShapeType="1" noTextEdit="1"/>
+          </p:cNvSpPr>
+          <p:nvPr>
+            <p:extLst>
+              <p:ext uri="{386F3935-93C4-4BCD-93E2-E3B085C9AB24}">
+                <p16:designElem xmlns:p16="http://schemas.microsoft.com/office/powerpoint/2015/main" val="1"/>
+              </p:ext>
+            </p:extLst>
+          </p:nvPr>
+        </p:nvSpPr>
+        <p:spPr>
+          <a:xfrm>
+            <a:off x="1524" y="0"/>
+            <a:ext cx="12188952" cy="6858000"/>
+          </a:xfrm>
+          <a:prstGeom prst="rect">
+            <a:avLst/>
+          </a:prstGeom>
+          <a:solidFill>
+            <a:schemeClr val="tx1"/>
+          </a:solidFill>
+          <a:ln>
+            <a:noFill/>
+          </a:ln>
+        </p:spPr>
+        <p:style>
+          <a:lnRef idx="2">
+            <a:schemeClr val="accent1">
+              <a:shade val="50000"/>
+            </a:schemeClr>
+          </a:lnRef>
+          <a:fillRef idx="1">
+            <a:schemeClr val="accent1"/>
+          </a:fillRef>
+          <a:effectRef idx="0">
+            <a:schemeClr val="accent1"/>
+          </a:effectRef>
+          <a:fontRef idx="minor">
+            <a:schemeClr val="lt1"/>
+          </a:fontRef>
+        </p:style>
+        <p:txBody>
+          <a:bodyPr rtlCol="0" anchor="ctr"/>
+          <a:lstStyle/>
+          <a:p>
+            <a:pPr algn="ctr"/>
+            <a:endParaRPr lang="en-US"/>
+          </a:p>
+        </p:txBody>
+      </p:sp>
+      <p:sp>
+        <p:nvSpPr>
+          <p:cNvPr id="20" name="Rectangle 19">
+            <a:extLst>
+              <a:ext uri="{FF2B5EF4-FFF2-40B4-BE49-F238E27FC236}">
+                <a16:creationId xmlns:a16="http://schemas.microsoft.com/office/drawing/2014/main" id="{EDEE9D42-BBE7-4427-9BC3-971CE96F1E29}"/>
+              </a:ext>
+              <a:ext uri="{C183D7F6-B498-43B3-948B-1728B52AA6E4}">
+                <adec:decorative xmlns:adec="http://schemas.microsoft.com/office/drawing/2017/decorative" val="1"/>
+              </a:ext>
+            </a:extLst>
+          </p:cNvPr>
+          <p:cNvSpPr>
+            <a:spLocks noGrp="1" noRot="1" noChangeAspect="1" noMove="1" noResize="1" noEditPoints="1" noAdjustHandles="1" noChangeArrowheads="1" noChangeShapeType="1" noTextEdit="1"/>
+          </p:cNvSpPr>
+          <p:nvPr>
+            <p:extLst>
+              <p:ext uri="{386F3935-93C4-4BCD-93E2-E3B085C9AB24}">
+                <p16:designElem xmlns:p16="http://schemas.microsoft.com/office/powerpoint/2015/main" val="1"/>
+              </p:ext>
+            </p:extLst>
+          </p:nvPr>
+        </p:nvSpPr>
+        <p:spPr>
+          <a:xfrm>
+            <a:off x="0" y="646441"/>
+            <a:ext cx="12188952" cy="3952189"/>
+          </a:xfrm>
+          <a:prstGeom prst="rect">
+            <a:avLst/>
+          </a:prstGeom>
+          <a:solidFill>
+            <a:schemeClr val="bg1"/>
+          </a:solidFill>
+          <a:ln>
+            <a:noFill/>
+          </a:ln>
+        </p:spPr>
+        <p:style>
+          <a:lnRef idx="2">
+            <a:schemeClr val="accent1">
+              <a:shade val="50000"/>
+            </a:schemeClr>
+          </a:lnRef>
+          <a:fillRef idx="1">
+            <a:schemeClr val="accent1"/>
+          </a:fillRef>
+          <a:effectRef idx="0">
+            <a:schemeClr val="accent1"/>
+          </a:effectRef>
+          <a:fontRef idx="minor">
+            <a:schemeClr val="lt1"/>
+          </a:fontRef>
+        </p:style>
+        <p:txBody>
+          <a:bodyPr rtlCol="0" anchor="ctr"/>
+          <a:lstStyle/>
+          <a:p>
+            <a:pPr algn="ctr"/>
+            <a:endParaRPr lang="en-US" dirty="0"/>
+          </a:p>
+        </p:txBody>
+      </p:sp>
+      <p:sp>
+        <p:nvSpPr>
+          <p:cNvPr id="2" name="Title 1">
+            <a:extLst>
+              <a:ext uri="{FF2B5EF4-FFF2-40B4-BE49-F238E27FC236}">
+                <a16:creationId xmlns:a16="http://schemas.microsoft.com/office/drawing/2014/main" id="{20CB008E-DBD9-FAE0-F7CE-415EAA8F5BD4}"/>
+              </a:ext>
+            </a:extLst>
+          </p:cNvPr>
+          <p:cNvSpPr>
+            <a:spLocks noGrp="1"/>
+          </p:cNvSpPr>
+          <p:nvPr>
+            <p:ph type="ctrTitle"/>
+          </p:nvPr>
+        </p:nvSpPr>
+        <p:spPr>
+          <a:xfrm>
+            <a:off x="960121" y="1240403"/>
+            <a:ext cx="5943600" cy="2941983"/>
+          </a:xfrm>
+        </p:spPr>
+        <p:txBody>
+          <a:bodyPr anchor="ctr">
+            <a:normAutofit/>
+          </a:bodyPr>
+          <a:lstStyle/>
+          <a:p>
+            <a:pPr algn="l"/>
+            <a:r>
+              <a:rPr lang="en-US" sz="6800"/>
+              <a:t>MPP – project</a:t>
+            </a:r>
+            <a:br>
+              <a:rPr lang="en-US" sz="6800"/>
+            </a:br>
+            <a:r>
+              <a:rPr lang="en-US" sz="6800"/>
+              <a:t>Library system</a:t>
+            </a:r>
+          </a:p>
+        </p:txBody>
+      </p:sp>
+      <p:sp>
+        <p:nvSpPr>
+          <p:cNvPr id="3" name="Subtitle 2">
+            <a:extLst>
+              <a:ext uri="{FF2B5EF4-FFF2-40B4-BE49-F238E27FC236}">
+                <a16:creationId xmlns:a16="http://schemas.microsoft.com/office/drawing/2014/main" id="{BC98E930-6228-3950-EEE2-D0C4CB6DD0A4}"/>
+              </a:ext>
+            </a:extLst>
+          </p:cNvPr>
+          <p:cNvSpPr>
+            <a:spLocks noGrp="1"/>
+          </p:cNvSpPr>
+          <p:nvPr>
+            <p:ph type="subTitle" idx="1"/>
+          </p:nvPr>
+        </p:nvSpPr>
+        <p:spPr>
+          <a:xfrm>
+            <a:off x="960120" y="5206247"/>
+            <a:ext cx="10268712" cy="1013577"/>
+          </a:xfrm>
+        </p:spPr>
+        <p:txBody>
+          <a:bodyPr>
+            <a:normAutofit/>
+          </a:bodyPr>
+          <a:lstStyle/>
+          <a:p>
+            <a:pPr algn="l">
+              <a:lnSpc>
+                <a:spcPct val="91000"/>
+              </a:lnSpc>
+            </a:pPr>
+            <a:r>
+              <a:rPr lang="en-US" sz="1200"/>
+              <a:t>Group 1: </a:t>
+            </a:r>
+          </a:p>
+          <a:p>
+            <a:pPr algn="l">
+              <a:lnSpc>
+                <a:spcPct val="91000"/>
+              </a:lnSpc>
+            </a:pPr>
+            <a:r>
+              <a:rPr lang="en-US" sz="1200"/>
+              <a:t>Huynh Anh Vu Nguyen (Cris)</a:t>
+            </a:r>
+          </a:p>
+          <a:p>
+            <a:pPr algn="l">
+              <a:lnSpc>
+                <a:spcPct val="91000"/>
+              </a:lnSpc>
+            </a:pPr>
+            <a:r>
+              <a:rPr lang="en-US" sz="1200"/>
+              <a:t>Anh Tuan Ha</a:t>
+            </a:r>
+          </a:p>
+        </p:txBody>
+      </p:sp>
+      <p:pic>
+        <p:nvPicPr>
+          <p:cNvPr id="4" name="Picture 3">
+            <a:extLst>
+              <a:ext uri="{FF2B5EF4-FFF2-40B4-BE49-F238E27FC236}">
+                <a16:creationId xmlns:a16="http://schemas.microsoft.com/office/drawing/2014/main" id="{B978FD2A-3BFF-6676-97E0-05C47EFDB981}"/>
+              </a:ext>
+            </a:extLst>
+          </p:cNvPr>
+          <p:cNvPicPr>
+            <a:picLocks noChangeAspect="1"/>
+          </p:cNvPicPr>
+          <p:nvPr/>
+        </p:nvPicPr>
+        <p:blipFill rotWithShape="1">
+          <a:blip r:embed="rId2"/>
+          <a:srcRect r="35754" b="-2"/>
+          <a:stretch/>
+        </p:blipFill>
+        <p:spPr>
+          <a:xfrm>
+            <a:off x="7533136" y="646441"/>
+            <a:ext cx="4658863" cy="3952185"/>
+          </a:xfrm>
+          <a:prstGeom prst="rect">
+            <a:avLst/>
+          </a:prstGeom>
+        </p:spPr>
+      </p:pic>
+    </p:spTree>
+    <p:extLst>
+      <p:ext uri="{BB962C8B-B14F-4D97-AF65-F5344CB8AC3E}">
+        <p14:creationId xmlns:p14="http://schemas.microsoft.com/office/powerpoint/2010/main" val="957547278"/>
+      </p:ext>
+    </p:extLst>
+  </p:cSld>
+  <p:clrMapOvr>
+    <a:masterClrMapping/>
+  </p:clrMapOvr>
+</p:sld>
+</file>
+
+<file path=ppt/slides/slide2.xml><?xml version="1.0" encoding="utf-8"?>
+<p:sld xmlns:a="http://schemas.openxmlformats.org/drawingml/2006/main" xmlns:r="http://schemas.openxmlformats.org/officeDocument/2006/relationships" xmlns:p="http://schemas.openxmlformats.org/presentationml/2006/main">
+  <p:cSld>
+    <p:bg>
+      <p:bgPr>
+        <a:solidFill>
+          <a:schemeClr val="bg1"/>
+        </a:solidFill>
+        <a:effectLst/>
+      </p:bgPr>
+    </p:bg>
+    <p:spTree>
+      <p:nvGrpSpPr>
+        <p:cNvPr id="1" name=""/>
+        <p:cNvGrpSpPr/>
+        <p:nvPr/>
+      </p:nvGrpSpPr>
+      <p:grpSpPr>
+        <a:xfrm>
+          <a:off x="0" y="0"/>
+          <a:ext cx="0" cy="0"/>
+          <a:chOff x="0" y="0"/>
+          <a:chExt cx="0" cy="0"/>
+        </a:xfrm>
+      </p:grpSpPr>
+      <p:sp>
+        <p:nvSpPr>
+          <p:cNvPr id="10" name="Rectangle 9">
+            <a:extLst>
+              <a:ext uri="{FF2B5EF4-FFF2-40B4-BE49-F238E27FC236}">
+                <a16:creationId xmlns:a16="http://schemas.microsoft.com/office/drawing/2014/main" id="{09A1C012-8297-4361-ACE8-A2509FB18911}"/>
+              </a:ext>
+              <a:ext uri="{C183D7F6-B498-43B3-948B-1728B52AA6E4}">
+                <adec:decorative xmlns:adec="http://schemas.microsoft.com/office/drawing/2017/decorative" val="1"/>
+              </a:ext>
+            </a:extLst>
+          </p:cNvPr>
+          <p:cNvSpPr>
+            <a:spLocks noGrp="1" noRot="1" noChangeAspect="1" noMove="1" noResize="1" noEditPoints="1" noAdjustHandles="1" noChangeArrowheads="1" noChangeShapeType="1" noTextEdit="1"/>
+          </p:cNvSpPr>
+          <p:nvPr>
+            <p:extLst>
+              <p:ext uri="{386F3935-93C4-4BCD-93E2-E3B085C9AB24}">
+                <p16:designElem xmlns:p16="http://schemas.microsoft.com/office/powerpoint/2015/main" val="1"/>
+              </p:ext>
+            </p:extLst>
+          </p:nvPr>
+        </p:nvSpPr>
+        <p:spPr>
+          <a:xfrm>
+            <a:off x="0" y="4206240"/>
+            <a:ext cx="12192000" cy="2651760"/>
+          </a:xfrm>
+          <a:prstGeom prst="rect">
+            <a:avLst/>
+          </a:prstGeom>
+          <a:solidFill>
+            <a:schemeClr val="tx1"/>
+          </a:solidFill>
+          <a:ln>
+            <a:noFill/>
+          </a:ln>
+        </p:spPr>
+        <p:style>
+          <a:lnRef idx="2">
+            <a:schemeClr val="accent1">
+              <a:shade val="50000"/>
+            </a:schemeClr>
+          </a:lnRef>
+          <a:fillRef idx="1">
+            <a:schemeClr val="accent1"/>
+          </a:fillRef>
+          <a:effectRef idx="0">
+            <a:schemeClr val="accent1"/>
+          </a:effectRef>
+          <a:fontRef idx="minor">
+            <a:schemeClr val="lt1"/>
+          </a:fontRef>
+        </p:style>
+        <p:txBody>
+          <a:bodyPr rtlCol="0" anchor="ctr"/>
+          <a:lstStyle/>
+          <a:p>
+            <a:pPr algn="ctr"/>
+            <a:endParaRPr lang="en-US"/>
+          </a:p>
+        </p:txBody>
+      </p:sp>
+      <p:sp useBgFill="1">
+        <p:nvSpPr>
+          <p:cNvPr id="12" name="Rectangle 11">
+            <a:extLst>
+              <a:ext uri="{FF2B5EF4-FFF2-40B4-BE49-F238E27FC236}">
+                <a16:creationId xmlns:a16="http://schemas.microsoft.com/office/drawing/2014/main" id="{4AA13AD3-0A4F-475A-BEBB-DEEFF5C096C3}"/>
+              </a:ext>
+              <a:ext uri="{C183D7F6-B498-43B3-948B-1728B52AA6E4}">
+                <adec:decorative xmlns:adec="http://schemas.microsoft.com/office/drawing/2017/decorative" val="1"/>
+              </a:ext>
+            </a:extLst>
+          </p:cNvPr>
+          <p:cNvSpPr>
+            <a:spLocks noGrp="1" noRot="1" noChangeAspect="1" noMove="1" noResize="1" noEditPoints="1" noAdjustHandles="1" noChangeArrowheads="1" noChangeShapeType="1" noTextEdit="1"/>
+          </p:cNvSpPr>
+          <p:nvPr>
+            <p:extLst>
+              <p:ext uri="{386F3935-93C4-4BCD-93E2-E3B085C9AB24}">
+                <p16:designElem xmlns:p16="http://schemas.microsoft.com/office/powerpoint/2015/main" val="1"/>
+              </p:ext>
+            </p:extLst>
+          </p:nvPr>
+        </p:nvSpPr>
+        <p:spPr>
+          <a:xfrm>
+            <a:off x="0" y="0"/>
+            <a:ext cx="12192000" cy="6858000"/>
+          </a:xfrm>
+          <a:prstGeom prst="rect">
+            <a:avLst/>
+          </a:prstGeom>
+          <a:ln>
+            <a:noFill/>
+          </a:ln>
+        </p:spPr>
+        <p:style>
+          <a:lnRef idx="2">
+            <a:schemeClr val="accent1">
+              <a:shade val="50000"/>
+            </a:schemeClr>
+          </a:lnRef>
+          <a:fillRef idx="1">
+            <a:schemeClr val="accent1"/>
+          </a:fillRef>
+          <a:effectRef idx="0">
+            <a:schemeClr val="accent1"/>
+          </a:effectRef>
+          <a:fontRef idx="minor">
+            <a:schemeClr val="lt1"/>
+          </a:fontRef>
+        </p:style>
+        <p:txBody>
+          <a:bodyPr rtlCol="0" anchor="ctr"/>
+          <a:lstStyle/>
+          <a:p>
+            <a:pPr algn="ctr"/>
+            <a:endParaRPr lang="en-US"/>
+          </a:p>
+        </p:txBody>
+      </p:sp>
+      <p:sp>
+        <p:nvSpPr>
+          <p:cNvPr id="14" name="Rectangle 13">
+            <a:extLst>
+              <a:ext uri="{FF2B5EF4-FFF2-40B4-BE49-F238E27FC236}">
+                <a16:creationId xmlns:a16="http://schemas.microsoft.com/office/drawing/2014/main" id="{52F9B1C2-7D20-4F91-A660-197C98B9A3B1}"/>
+              </a:ext>
+              <a:ext uri="{C183D7F6-B498-43B3-948B-1728B52AA6E4}">
+                <adec:decorative xmlns:adec="http://schemas.microsoft.com/office/drawing/2017/decorative" val="1"/>
+              </a:ext>
+            </a:extLst>
+          </p:cNvPr>
+          <p:cNvSpPr>
+            <a:spLocks noGrp="1" noRot="1" noChangeAspect="1" noMove="1" noResize="1" noEditPoints="1" noAdjustHandles="1" noChangeArrowheads="1" noChangeShapeType="1" noTextEdit="1"/>
+          </p:cNvSpPr>
+          <p:nvPr>
+            <p:extLst>
+              <p:ext uri="{386F3935-93C4-4BCD-93E2-E3B085C9AB24}">
+                <p16:designElem xmlns:p16="http://schemas.microsoft.com/office/powerpoint/2015/main" val="1"/>
+              </p:ext>
+            </p:extLst>
+          </p:nvPr>
+        </p:nvSpPr>
+        <p:spPr>
+          <a:xfrm>
+            <a:off x="0" y="1939445"/>
+            <a:ext cx="6114985" cy="2298326"/>
+          </a:xfrm>
+          <a:prstGeom prst="rect">
+            <a:avLst/>
+          </a:prstGeom>
+          <a:solidFill>
+            <a:schemeClr val="tx1">
+              <a:alpha val="96000"/>
+            </a:schemeClr>
+          </a:solidFill>
+          <a:ln>
+            <a:noFill/>
+          </a:ln>
+        </p:spPr>
+        <p:style>
+          <a:lnRef idx="2">
+            <a:schemeClr val="accent1">
+              <a:shade val="50000"/>
+            </a:schemeClr>
+          </a:lnRef>
+          <a:fillRef idx="1">
+            <a:schemeClr val="accent1"/>
+          </a:fillRef>
+          <a:effectRef idx="0">
+            <a:schemeClr val="accent1"/>
+          </a:effectRef>
+          <a:fontRef idx="minor">
+            <a:schemeClr val="lt1"/>
+          </a:fontRef>
+        </p:style>
+        <p:txBody>
+          <a:bodyPr rtlCol="0" anchor="ctr"/>
+          <a:lstStyle/>
+          <a:p>
+            <a:pPr algn="ctr"/>
+            <a:endParaRPr lang="en-US"/>
+          </a:p>
+        </p:txBody>
+      </p:sp>
+      <p:sp>
+        <p:nvSpPr>
+          <p:cNvPr id="2" name="Title 1">
+            <a:extLst>
+              <a:ext uri="{FF2B5EF4-FFF2-40B4-BE49-F238E27FC236}">
+                <a16:creationId xmlns:a16="http://schemas.microsoft.com/office/drawing/2014/main" id="{95A99755-67E8-150A-D27C-C211ED64DAF6}"/>
+              </a:ext>
+            </a:extLst>
+          </p:cNvPr>
+          <p:cNvSpPr>
+            <a:spLocks noGrp="1"/>
+          </p:cNvSpPr>
+          <p:nvPr>
+            <p:ph type="title"/>
+          </p:nvPr>
+        </p:nvSpPr>
+        <p:spPr>
+          <a:xfrm>
+            <a:off x="960119" y="2100845"/>
+            <a:ext cx="4670234" cy="1975527"/>
+          </a:xfrm>
+        </p:spPr>
+        <p:txBody>
+          <a:bodyPr vert="horz" lIns="91440" tIns="45720" rIns="91440" bIns="45720" rtlCol="0" anchor="ctr">
+            <a:normAutofit/>
+          </a:bodyPr>
+          <a:lstStyle/>
+          <a:p>
+            <a:r>
+              <a:rPr lang="en-US" dirty="0"/>
+              <a:t>Use case</a:t>
+            </a:r>
+          </a:p>
+        </p:txBody>
+      </p:sp>
+      <p:sp useBgFill="1">
+        <p:nvSpPr>
+          <p:cNvPr id="16" name="Rectangle 15">
+            <a:extLst>
+              <a:ext uri="{FF2B5EF4-FFF2-40B4-BE49-F238E27FC236}">
+                <a16:creationId xmlns:a16="http://schemas.microsoft.com/office/drawing/2014/main" id="{A89C4E6E-ECA4-40E5-A54E-13E92B678E8C}"/>
+              </a:ext>
+              <a:ext uri="{C183D7F6-B498-43B3-948B-1728B52AA6E4}">
+                <adec:decorative xmlns:adec="http://schemas.microsoft.com/office/drawing/2017/decorative" val="1"/>
+              </a:ext>
+            </a:extLst>
+          </p:cNvPr>
+          <p:cNvSpPr>
+            <a:spLocks noGrp="1" noRot="1" noChangeAspect="1" noMove="1" noResize="1" noEditPoints="1" noAdjustHandles="1" noChangeArrowheads="1" noChangeShapeType="1" noTextEdit="1"/>
+          </p:cNvSpPr>
+          <p:nvPr>
+            <p:extLst>
+              <p:ext uri="{386F3935-93C4-4BCD-93E2-E3B085C9AB24}">
+                <p16:designElem xmlns:p16="http://schemas.microsoft.com/office/powerpoint/2015/main" val="1"/>
+              </p:ext>
+            </p:extLst>
+          </p:nvPr>
+        </p:nvSpPr>
+        <p:spPr>
+          <a:xfrm>
+            <a:off x="2" y="4237771"/>
+            <a:ext cx="6114982" cy="809351"/>
+          </a:xfrm>
+          <a:prstGeom prst="rect">
+            <a:avLst/>
+          </a:prstGeom>
+          <a:ln>
+            <a:noFill/>
+          </a:ln>
+        </p:spPr>
+        <p:style>
+          <a:lnRef idx="2">
+            <a:schemeClr val="accent1">
+              <a:shade val="50000"/>
+            </a:schemeClr>
+          </a:lnRef>
+          <a:fillRef idx="1">
+            <a:schemeClr val="accent1"/>
+          </a:fillRef>
+          <a:effectRef idx="0">
+            <a:schemeClr val="accent1"/>
+          </a:effectRef>
+          <a:fontRef idx="minor">
+            <a:schemeClr val="lt1"/>
+          </a:fontRef>
+        </p:style>
+        <p:txBody>
+          <a:bodyPr rtlCol="0" anchor="ctr"/>
+          <a:lstStyle/>
+          <a:p>
+            <a:pPr algn="ctr"/>
+            <a:endParaRPr lang="en-US"/>
+          </a:p>
+        </p:txBody>
+      </p:sp>
+      <p:pic>
+        <p:nvPicPr>
+          <p:cNvPr id="5" name="Content Placeholder 4" descr="A diagram of a system&#10;&#10;Description automatically generated">
+            <a:extLst>
+              <a:ext uri="{FF2B5EF4-FFF2-40B4-BE49-F238E27FC236}">
+                <a16:creationId xmlns:a16="http://schemas.microsoft.com/office/drawing/2014/main" id="{6D526E97-D63E-657E-A017-83554D2E6FA2}"/>
+              </a:ext>
+            </a:extLst>
+          </p:cNvPr>
+          <p:cNvPicPr>
+            <a:picLocks noGrp="1" noChangeAspect="1"/>
+          </p:cNvPicPr>
+          <p:nvPr>
+            <p:ph idx="1"/>
+          </p:nvPr>
+        </p:nvPicPr>
+        <p:blipFill>
+          <a:blip r:embed="rId2"/>
+          <a:stretch>
+            <a:fillRect/>
+          </a:stretch>
+        </p:blipFill>
+        <p:spPr>
+          <a:xfrm>
+            <a:off x="6689537" y="0"/>
+            <a:ext cx="4927909" cy="6548720"/>
+          </a:xfrm>
+          <a:prstGeom prst="rect">
+            <a:avLst/>
+          </a:prstGeom>
+        </p:spPr>
+      </p:pic>
+    </p:spTree>
+    <p:extLst>
+      <p:ext uri="{BB962C8B-B14F-4D97-AF65-F5344CB8AC3E}">
+        <p14:creationId xmlns:p14="http://schemas.microsoft.com/office/powerpoint/2010/main" val="3015970725"/>
+      </p:ext>
+    </p:extLst>
+  </p:cSld>
+  <p:clrMapOvr>
+    <a:masterClrMapping/>
+  </p:clrMapOvr>
+</p:sld>
+</file>
+
+<file path=ppt/slides/slide3.xml><?xml version="1.0" encoding="utf-8"?>
+<p:sld xmlns:a="http://schemas.openxmlformats.org/drawingml/2006/main" xmlns:r="http://schemas.openxmlformats.org/officeDocument/2006/relationships" xmlns:p="http://schemas.openxmlformats.org/presentationml/2006/main">
+  <p:cSld>
+    <p:bg>
+      <p:bgPr>
+        <a:solidFill>
+          <a:schemeClr val="bg1"/>
+        </a:solidFill>
+        <a:effectLst/>
+      </p:bgPr>
+    </p:bg>
+    <p:spTree>
+      <p:nvGrpSpPr>
+        <p:cNvPr id="1" name=""/>
+        <p:cNvGrpSpPr/>
+        <p:nvPr/>
+      </p:nvGrpSpPr>
+      <p:grpSpPr>
+        <a:xfrm>
+          <a:off x="0" y="0"/>
+          <a:ext cx="0" cy="0"/>
+          <a:chOff x="0" y="0"/>
+          <a:chExt cx="0" cy="0"/>
+        </a:xfrm>
+      </p:grpSpPr>
+      <p:sp>
+        <p:nvSpPr>
+          <p:cNvPr id="10" name="Rectangle 9">
+            <a:extLst>
+              <a:ext uri="{FF2B5EF4-FFF2-40B4-BE49-F238E27FC236}">
+                <a16:creationId xmlns:a16="http://schemas.microsoft.com/office/drawing/2014/main" id="{09A1C012-8297-4361-ACE8-A2509FB18911}"/>
+              </a:ext>
+              <a:ext uri="{C183D7F6-B498-43B3-948B-1728B52AA6E4}">
+                <adec:decorative xmlns:adec="http://schemas.microsoft.com/office/drawing/2017/decorative" val="1"/>
+              </a:ext>
+            </a:extLst>
+          </p:cNvPr>
+          <p:cNvSpPr>
+            <a:spLocks noGrp="1" noRot="1" noChangeAspect="1" noMove="1" noResize="1" noEditPoints="1" noAdjustHandles="1" noChangeArrowheads="1" noChangeShapeType="1" noTextEdit="1"/>
+          </p:cNvSpPr>
+          <p:nvPr>
+            <p:extLst>
+              <p:ext uri="{386F3935-93C4-4BCD-93E2-E3B085C9AB24}">
+                <p16:designElem xmlns:p16="http://schemas.microsoft.com/office/powerpoint/2015/main" val="1"/>
+              </p:ext>
+            </p:extLst>
+          </p:nvPr>
+        </p:nvSpPr>
+        <p:spPr>
+          <a:xfrm>
+            <a:off x="0" y="4206240"/>
+            <a:ext cx="12192000" cy="2651760"/>
+          </a:xfrm>
+          <a:prstGeom prst="rect">
+            <a:avLst/>
+          </a:prstGeom>
+          <a:solidFill>
+            <a:schemeClr val="tx1"/>
+          </a:solidFill>
+          <a:ln>
+            <a:noFill/>
+          </a:ln>
+        </p:spPr>
+        <p:style>
+          <a:lnRef idx="2">
+            <a:schemeClr val="accent1">
+              <a:shade val="50000"/>
+            </a:schemeClr>
+          </a:lnRef>
+          <a:fillRef idx="1">
+            <a:schemeClr val="accent1"/>
+          </a:fillRef>
+          <a:effectRef idx="0">
+            <a:schemeClr val="accent1"/>
+          </a:effectRef>
+          <a:fontRef idx="minor">
+            <a:schemeClr val="lt1"/>
+          </a:fontRef>
+        </p:style>
+        <p:txBody>
+          <a:bodyPr rtlCol="0" anchor="ctr"/>
+          <a:lstStyle/>
+          <a:p>
+            <a:pPr algn="ctr"/>
+            <a:endParaRPr lang="en-US"/>
+          </a:p>
+        </p:txBody>
+      </p:sp>
+      <p:sp useBgFill="1">
+        <p:nvSpPr>
+          <p:cNvPr id="12" name="Rectangle 11">
+            <a:extLst>
+              <a:ext uri="{FF2B5EF4-FFF2-40B4-BE49-F238E27FC236}">
+                <a16:creationId xmlns:a16="http://schemas.microsoft.com/office/drawing/2014/main" id="{4AA13AD3-0A4F-475A-BEBB-DEEFF5C096C3}"/>
+              </a:ext>
+              <a:ext uri="{C183D7F6-B498-43B3-948B-1728B52AA6E4}">
+                <adec:decorative xmlns:adec="http://schemas.microsoft.com/office/drawing/2017/decorative" val="1"/>
+              </a:ext>
+            </a:extLst>
+          </p:cNvPr>
+          <p:cNvSpPr>
+            <a:spLocks noGrp="1" noRot="1" noChangeAspect="1" noMove="1" noResize="1" noEditPoints="1" noAdjustHandles="1" noChangeArrowheads="1" noChangeShapeType="1" noTextEdit="1"/>
+          </p:cNvSpPr>
+          <p:nvPr>
+            <p:extLst>
+              <p:ext uri="{386F3935-93C4-4BCD-93E2-E3B085C9AB24}">
+                <p16:designElem xmlns:p16="http://schemas.microsoft.com/office/powerpoint/2015/main" val="1"/>
+              </p:ext>
+            </p:extLst>
+          </p:nvPr>
+        </p:nvSpPr>
+        <p:spPr>
+          <a:xfrm>
+            <a:off x="0" y="0"/>
+            <a:ext cx="12192000" cy="6858000"/>
+          </a:xfrm>
+          <a:prstGeom prst="rect">
+            <a:avLst/>
+          </a:prstGeom>
+          <a:ln>
+            <a:noFill/>
+          </a:ln>
+        </p:spPr>
+        <p:style>
+          <a:lnRef idx="2">
+            <a:schemeClr val="accent1">
+              <a:shade val="50000"/>
+            </a:schemeClr>
+          </a:lnRef>
+          <a:fillRef idx="1">
+            <a:schemeClr val="accent1"/>
+          </a:fillRef>
+          <a:effectRef idx="0">
+            <a:schemeClr val="accent1"/>
+          </a:effectRef>
+          <a:fontRef idx="minor">
+            <a:schemeClr val="lt1"/>
+          </a:fontRef>
+        </p:style>
+        <p:txBody>
+          <a:bodyPr rtlCol="0" anchor="ctr"/>
+          <a:lstStyle/>
+          <a:p>
+            <a:pPr algn="ctr"/>
+            <a:endParaRPr lang="en-US"/>
+          </a:p>
+        </p:txBody>
+      </p:sp>
+      <p:sp>
+        <p:nvSpPr>
+          <p:cNvPr id="14" name="Rectangle 13">
+            <a:extLst>
+              <a:ext uri="{FF2B5EF4-FFF2-40B4-BE49-F238E27FC236}">
+                <a16:creationId xmlns:a16="http://schemas.microsoft.com/office/drawing/2014/main" id="{52F9B1C2-7D20-4F91-A660-197C98B9A3B1}"/>
+              </a:ext>
+              <a:ext uri="{C183D7F6-B498-43B3-948B-1728B52AA6E4}">
+                <adec:decorative xmlns:adec="http://schemas.microsoft.com/office/drawing/2017/decorative" val="1"/>
+              </a:ext>
+            </a:extLst>
+          </p:cNvPr>
+          <p:cNvSpPr>
+            <a:spLocks noGrp="1" noRot="1" noChangeAspect="1" noMove="1" noResize="1" noEditPoints="1" noAdjustHandles="1" noChangeArrowheads="1" noChangeShapeType="1" noTextEdit="1"/>
+          </p:cNvSpPr>
+          <p:nvPr>
+            <p:extLst>
+              <p:ext uri="{386F3935-93C4-4BCD-93E2-E3B085C9AB24}">
+                <p16:designElem xmlns:p16="http://schemas.microsoft.com/office/powerpoint/2015/main" val="1"/>
+              </p:ext>
+            </p:extLst>
+          </p:nvPr>
+        </p:nvSpPr>
+        <p:spPr>
+          <a:xfrm>
+            <a:off x="0" y="1939445"/>
+            <a:ext cx="6114985" cy="2298326"/>
+          </a:xfrm>
+          <a:prstGeom prst="rect">
+            <a:avLst/>
+          </a:prstGeom>
+          <a:solidFill>
+            <a:schemeClr val="tx1">
+              <a:alpha val="96000"/>
+            </a:schemeClr>
+          </a:solidFill>
+          <a:ln>
+            <a:noFill/>
+          </a:ln>
+        </p:spPr>
+        <p:style>
+          <a:lnRef idx="2">
+            <a:schemeClr val="accent1">
+              <a:shade val="50000"/>
+            </a:schemeClr>
+          </a:lnRef>
+          <a:fillRef idx="1">
+            <a:schemeClr val="accent1"/>
+          </a:fillRef>
+          <a:effectRef idx="0">
+            <a:schemeClr val="accent1"/>
+          </a:effectRef>
+          <a:fontRef idx="minor">
+            <a:schemeClr val="lt1"/>
+          </a:fontRef>
+        </p:style>
+        <p:txBody>
+          <a:bodyPr rtlCol="0" anchor="ctr"/>
+          <a:lstStyle/>
+          <a:p>
+            <a:pPr algn="ctr"/>
+            <a:endParaRPr lang="en-US"/>
+          </a:p>
+        </p:txBody>
+      </p:sp>
+      <p:sp>
+        <p:nvSpPr>
+          <p:cNvPr id="2" name="Title 1">
+            <a:extLst>
+              <a:ext uri="{FF2B5EF4-FFF2-40B4-BE49-F238E27FC236}">
+                <a16:creationId xmlns:a16="http://schemas.microsoft.com/office/drawing/2014/main" id="{0FD934C0-26EA-C166-E3BC-E83D430682B4}"/>
+              </a:ext>
+            </a:extLst>
+          </p:cNvPr>
+          <p:cNvSpPr>
+            <a:spLocks noGrp="1"/>
+          </p:cNvSpPr>
+          <p:nvPr>
+            <p:ph type="title"/>
+          </p:nvPr>
+        </p:nvSpPr>
+        <p:spPr>
+          <a:xfrm>
+            <a:off x="960119" y="2100845"/>
+            <a:ext cx="4670234" cy="1975527"/>
+          </a:xfrm>
+        </p:spPr>
+        <p:txBody>
+          <a:bodyPr vert="horz" lIns="91440" tIns="45720" rIns="91440" bIns="45720" rtlCol="0" anchor="ctr">
+            <a:normAutofit/>
+          </a:bodyPr>
+          <a:lstStyle/>
+          <a:p>
+            <a:r>
+              <a:rPr lang="en-US" dirty="0"/>
+              <a:t>Class diagram</a:t>
+            </a:r>
+          </a:p>
+        </p:txBody>
+      </p:sp>
+      <p:sp useBgFill="1">
+        <p:nvSpPr>
+          <p:cNvPr id="16" name="Rectangle 15">
+            <a:extLst>
+              <a:ext uri="{FF2B5EF4-FFF2-40B4-BE49-F238E27FC236}">
+                <a16:creationId xmlns:a16="http://schemas.microsoft.com/office/drawing/2014/main" id="{A89C4E6E-ECA4-40E5-A54E-13E92B678E8C}"/>
+              </a:ext>
+              <a:ext uri="{C183D7F6-B498-43B3-948B-1728B52AA6E4}">
+                <adec:decorative xmlns:adec="http://schemas.microsoft.com/office/drawing/2017/decorative" val="1"/>
+              </a:ext>
+            </a:extLst>
+          </p:cNvPr>
+          <p:cNvSpPr>
+            <a:spLocks noGrp="1" noRot="1" noChangeAspect="1" noMove="1" noResize="1" noEditPoints="1" noAdjustHandles="1" noChangeArrowheads="1" noChangeShapeType="1" noTextEdit="1"/>
+          </p:cNvSpPr>
+          <p:nvPr>
+            <p:extLst>
+              <p:ext uri="{386F3935-93C4-4BCD-93E2-E3B085C9AB24}">
+                <p16:designElem xmlns:p16="http://schemas.microsoft.com/office/powerpoint/2015/main" val="1"/>
+              </p:ext>
+            </p:extLst>
+          </p:nvPr>
+        </p:nvSpPr>
+        <p:spPr>
+          <a:xfrm>
+            <a:off x="2" y="4237771"/>
+            <a:ext cx="6114982" cy="809351"/>
+          </a:xfrm>
+          <a:prstGeom prst="rect">
+            <a:avLst/>
+          </a:prstGeom>
+          <a:ln>
+            <a:noFill/>
+          </a:ln>
+        </p:spPr>
+        <p:style>
+          <a:lnRef idx="2">
+            <a:schemeClr val="accent1">
+              <a:shade val="50000"/>
+            </a:schemeClr>
+          </a:lnRef>
+          <a:fillRef idx="1">
+            <a:schemeClr val="accent1"/>
+          </a:fillRef>
+          <a:effectRef idx="0">
+            <a:schemeClr val="accent1"/>
+          </a:effectRef>
+          <a:fontRef idx="minor">
+            <a:schemeClr val="lt1"/>
+          </a:fontRef>
+        </p:style>
+        <p:txBody>
+          <a:bodyPr rtlCol="0" anchor="ctr"/>
+          <a:lstStyle/>
+          <a:p>
+            <a:pPr algn="ctr"/>
+            <a:endParaRPr lang="en-US"/>
+          </a:p>
+        </p:txBody>
+      </p:sp>
+      <p:pic>
+        <p:nvPicPr>
+          <p:cNvPr id="5" name="Content Placeholder 4" descr="A screenshot of a computer&#10;&#10;Description automatically generated">
+            <a:extLst>
+              <a:ext uri="{FF2B5EF4-FFF2-40B4-BE49-F238E27FC236}">
+                <a16:creationId xmlns:a16="http://schemas.microsoft.com/office/drawing/2014/main" id="{3BFAFEFD-079B-3020-BD6D-30505AE7A5D9}"/>
+              </a:ext>
+            </a:extLst>
+          </p:cNvPr>
+          <p:cNvPicPr>
+            <a:picLocks noGrp="1" noChangeAspect="1"/>
+          </p:cNvPicPr>
+          <p:nvPr>
+            <p:ph idx="1"/>
+          </p:nvPr>
+        </p:nvPicPr>
+        <p:blipFill>
+          <a:blip r:embed="rId2"/>
+          <a:stretch>
+            <a:fillRect/>
+          </a:stretch>
+        </p:blipFill>
+        <p:spPr>
+          <a:xfrm>
+            <a:off x="6224762" y="81878"/>
+            <a:ext cx="5857460" cy="6694243"/>
+          </a:xfrm>
+          <a:prstGeom prst="rect">
+            <a:avLst/>
+          </a:prstGeom>
+        </p:spPr>
+      </p:pic>
+    </p:spTree>
+    <p:extLst>
+      <p:ext uri="{BB962C8B-B14F-4D97-AF65-F5344CB8AC3E}">
+        <p14:creationId xmlns:p14="http://schemas.microsoft.com/office/powerpoint/2010/main" val="1233873893"/>
+      </p:ext>
+    </p:extLst>
+  </p:cSld>
+  <p:clrMapOvr>
+    <a:masterClrMapping/>
+  </p:clrMapOvr>
+</p:sld>
+</file>
+
+<file path=ppt/slides/slide4.xml><?xml version="1.0" encoding="utf-8"?>
+<p:sld xmlns:a="http://schemas.openxmlformats.org/drawingml/2006/main" xmlns:r="http://schemas.openxmlformats.org/officeDocument/2006/relationships" xmlns:p="http://schemas.openxmlformats.org/presentationml/2006/main">
+  <p:cSld>
+    <p:spTree>
+      <p:nvGrpSpPr>
+        <p:cNvPr id="1" name=""/>
+        <p:cNvGrpSpPr/>
+        <p:nvPr/>
+      </p:nvGrpSpPr>
+      <p:grpSpPr>
+        <a:xfrm>
+          <a:off x="0" y="0"/>
+          <a:ext cx="0" cy="0"/>
+          <a:chOff x="0" y="0"/>
+          <a:chExt cx="0" cy="0"/>
+        </a:xfrm>
+      </p:grpSpPr>
+      <p:sp>
+        <p:nvSpPr>
+          <p:cNvPr id="2" name="Title 1">
+            <a:extLst>
+              <a:ext uri="{FF2B5EF4-FFF2-40B4-BE49-F238E27FC236}">
+                <a16:creationId xmlns:a16="http://schemas.microsoft.com/office/drawing/2014/main" id="{D787894A-F558-299E-F24A-EAECD544CED1}"/>
+              </a:ext>
+            </a:extLst>
+          </p:cNvPr>
+          <p:cNvSpPr>
+            <a:spLocks noGrp="1"/>
+          </p:cNvSpPr>
+          <p:nvPr>
+            <p:ph type="title"/>
+          </p:nvPr>
+        </p:nvSpPr>
+        <p:spPr/>
+        <p:txBody>
+          <a:bodyPr/>
+          <a:lstStyle/>
+          <a:p>
+            <a:r>
+              <a:rPr lang="en-US" dirty="0"/>
+              <a:t>Use case 1: Login</a:t>
+            </a:r>
+          </a:p>
+        </p:txBody>
+      </p:sp>
+      <p:pic>
+        <p:nvPicPr>
+          <p:cNvPr id="5" name="Content Placeholder 4" descr="A diagram of a login function&#10;&#10;Description automatically generated">
+            <a:extLst>
+              <a:ext uri="{FF2B5EF4-FFF2-40B4-BE49-F238E27FC236}">
+                <a16:creationId xmlns:a16="http://schemas.microsoft.com/office/drawing/2014/main" id="{FDFF6243-4706-B7A2-4E33-256D259EAE9D}"/>
+              </a:ext>
+            </a:extLst>
+          </p:cNvPr>
+          <p:cNvPicPr>
+            <a:picLocks noGrp="1" noChangeAspect="1"/>
+          </p:cNvPicPr>
+          <p:nvPr>
+            <p:ph idx="1"/>
+          </p:nvPr>
+        </p:nvPicPr>
+        <p:blipFill>
+          <a:blip r:embed="rId2"/>
+          <a:stretch>
+            <a:fillRect/>
+          </a:stretch>
+        </p:blipFill>
+        <p:spPr>
+          <a:xfrm>
+            <a:off x="3954204" y="2423729"/>
+            <a:ext cx="4283592" cy="4434271"/>
+          </a:xfrm>
+        </p:spPr>
+      </p:pic>
+    </p:spTree>
+    <p:extLst>
+      <p:ext uri="{BB962C8B-B14F-4D97-AF65-F5344CB8AC3E}">
+        <p14:creationId xmlns:p14="http://schemas.microsoft.com/office/powerpoint/2010/main" val="2479012229"/>
+      </p:ext>
+    </p:extLst>
+  </p:cSld>
+  <p:clrMapOvr>
+    <a:masterClrMapping/>
+  </p:clrMapOvr>
+</p:sld>
+</file>
+
+<file path=ppt/slides/slide5.xml><?xml version="1.0" encoding="utf-8"?>
+<p:sld xmlns:a="http://schemas.openxmlformats.org/drawingml/2006/main" xmlns:r="http://schemas.openxmlformats.org/officeDocument/2006/relationships" xmlns:p="http://schemas.openxmlformats.org/presentationml/2006/main">
+  <p:cSld>
+    <p:spTree>
+      <p:nvGrpSpPr>
+        <p:cNvPr id="1" name=""/>
+        <p:cNvGrpSpPr/>
+        <p:nvPr/>
+      </p:nvGrpSpPr>
+      <p:grpSpPr>
+        <a:xfrm>
+          <a:off x="0" y="0"/>
+          <a:ext cx="0" cy="0"/>
+          <a:chOff x="0" y="0"/>
+          <a:chExt cx="0" cy="0"/>
+        </a:xfrm>
+      </p:grpSpPr>
+      <p:sp>
+        <p:nvSpPr>
+          <p:cNvPr id="2" name="Title 1">
+            <a:extLst>
+              <a:ext uri="{FF2B5EF4-FFF2-40B4-BE49-F238E27FC236}">
+                <a16:creationId xmlns:a16="http://schemas.microsoft.com/office/drawing/2014/main" id="{D5472331-E046-83D8-BEDB-6FE11E6272D8}"/>
+              </a:ext>
+            </a:extLst>
+          </p:cNvPr>
+          <p:cNvSpPr>
+            <a:spLocks noGrp="1"/>
+          </p:cNvSpPr>
+          <p:nvPr>
+            <p:ph type="title"/>
+          </p:nvPr>
+        </p:nvSpPr>
+        <p:spPr/>
+        <p:txBody>
+          <a:bodyPr>
+            <a:normAutofit fontScale="90000"/>
+          </a:bodyPr>
+          <a:lstStyle/>
+          <a:p>
+            <a:r>
+              <a:rPr lang="en-US" dirty="0"/>
+              <a:t>User case 2: Add new library member</a:t>
+            </a:r>
+          </a:p>
+        </p:txBody>
+      </p:sp>
+      <p:pic>
+        <p:nvPicPr>
+          <p:cNvPr id="5" name="Content Placeholder 4" descr="A diagram of a user&#10;&#10;Description automatically generated">
+            <a:extLst>
+              <a:ext uri="{FF2B5EF4-FFF2-40B4-BE49-F238E27FC236}">
+                <a16:creationId xmlns:a16="http://schemas.microsoft.com/office/drawing/2014/main" id="{72EFA6BB-809C-8B75-216C-820F7ED12378}"/>
+              </a:ext>
+            </a:extLst>
+          </p:cNvPr>
+          <p:cNvPicPr>
+            <a:picLocks noGrp="1" noChangeAspect="1"/>
+          </p:cNvPicPr>
+          <p:nvPr>
+            <p:ph idx="1"/>
+          </p:nvPr>
+        </p:nvPicPr>
+        <p:blipFill>
+          <a:blip r:embed="rId2"/>
+          <a:stretch>
+            <a:fillRect/>
+          </a:stretch>
+        </p:blipFill>
+        <p:spPr>
+          <a:xfrm>
+            <a:off x="2943863" y="2719414"/>
+            <a:ext cx="6304273" cy="3820772"/>
+          </a:xfrm>
+        </p:spPr>
+      </p:pic>
+    </p:spTree>
+    <p:extLst>
+      <p:ext uri="{BB962C8B-B14F-4D97-AF65-F5344CB8AC3E}">
+        <p14:creationId xmlns:p14="http://schemas.microsoft.com/office/powerpoint/2010/main" val="3190030165"/>
+      </p:ext>
+    </p:extLst>
+  </p:cSld>
+  <p:clrMapOvr>
+    <a:masterClrMapping/>
+  </p:clrMapOvr>
+</p:sld>
+</file>
+
+<file path=ppt/slides/slide6.xml><?xml version="1.0" encoding="utf-8"?>
+<p:sld xmlns:a="http://schemas.openxmlformats.org/drawingml/2006/main" xmlns:r="http://schemas.openxmlformats.org/officeDocument/2006/relationships" xmlns:p="http://schemas.openxmlformats.org/presentationml/2006/main">
+  <p:cSld>
+    <p:spTree>
+      <p:nvGrpSpPr>
+        <p:cNvPr id="1" name=""/>
+        <p:cNvGrpSpPr/>
+        <p:nvPr/>
+      </p:nvGrpSpPr>
+      <p:grpSpPr>
+        <a:xfrm>
+          <a:off x="0" y="0"/>
+          <a:ext cx="0" cy="0"/>
+          <a:chOff x="0" y="0"/>
+          <a:chExt cx="0" cy="0"/>
+        </a:xfrm>
+      </p:grpSpPr>
+      <p:sp>
+        <p:nvSpPr>
+          <p:cNvPr id="2" name="Title 1">
+            <a:extLst>
+              <a:ext uri="{FF2B5EF4-FFF2-40B4-BE49-F238E27FC236}">
+                <a16:creationId xmlns:a16="http://schemas.microsoft.com/office/drawing/2014/main" id="{456E714B-A709-2DD6-056B-FE9B0C9017DF}"/>
+              </a:ext>
+            </a:extLst>
+          </p:cNvPr>
+          <p:cNvSpPr>
+            <a:spLocks noGrp="1"/>
+          </p:cNvSpPr>
+          <p:nvPr>
+            <p:ph type="title"/>
+          </p:nvPr>
+        </p:nvSpPr>
+        <p:spPr/>
+        <p:txBody>
+          <a:bodyPr/>
+          <a:lstStyle/>
+          <a:p>
+            <a:r>
+              <a:rPr lang="en-US" dirty="0"/>
+              <a:t>Use case 3: check out</a:t>
+            </a:r>
+          </a:p>
+        </p:txBody>
+      </p:sp>
+      <p:pic>
+        <p:nvPicPr>
+          <p:cNvPr id="9" name="Content Placeholder 8" descr="A screenshot of a diagram&#10;&#10;Description automatically generated">
+            <a:extLst>
+              <a:ext uri="{FF2B5EF4-FFF2-40B4-BE49-F238E27FC236}">
+                <a16:creationId xmlns:a16="http://schemas.microsoft.com/office/drawing/2014/main" id="{E73D4890-312C-8A3C-E1C1-800F9F8BC609}"/>
+              </a:ext>
+            </a:extLst>
+          </p:cNvPr>
+          <p:cNvPicPr>
+            <a:picLocks noGrp="1" noChangeAspect="1"/>
+          </p:cNvPicPr>
+          <p:nvPr>
+            <p:ph idx="1"/>
+          </p:nvPr>
+        </p:nvPicPr>
+        <p:blipFill>
+          <a:blip r:embed="rId2"/>
+          <a:stretch>
+            <a:fillRect/>
+          </a:stretch>
+        </p:blipFill>
+        <p:spPr>
+          <a:xfrm>
+            <a:off x="2633904" y="2442573"/>
+            <a:ext cx="6924192" cy="4415427"/>
+          </a:xfrm>
+        </p:spPr>
+      </p:pic>
+    </p:spTree>
+    <p:extLst>
+      <p:ext uri="{BB962C8B-B14F-4D97-AF65-F5344CB8AC3E}">
+        <p14:creationId xmlns:p14="http://schemas.microsoft.com/office/powerpoint/2010/main" val="4056876501"/>
+      </p:ext>
+    </p:extLst>
+  </p:cSld>
+  <p:clrMapOvr>
+    <a:masterClrMapping/>
+  </p:clrMapOvr>
+</p:sld>
+</file>
+
+<file path=ppt/slides/slide7.xml><?xml version="1.0" encoding="utf-8"?>
+<p:sld xmlns:a="http://schemas.openxmlformats.org/drawingml/2006/main" xmlns:r="http://schemas.openxmlformats.org/officeDocument/2006/relationships" xmlns:p="http://schemas.openxmlformats.org/presentationml/2006/main">
+  <p:cSld>
+    <p:spTree>
+      <p:nvGrpSpPr>
+        <p:cNvPr id="1" name=""/>
+        <p:cNvGrpSpPr/>
+        <p:nvPr/>
+      </p:nvGrpSpPr>
+      <p:grpSpPr>
+        <a:xfrm>
+          <a:off x="0" y="0"/>
+          <a:ext cx="0" cy="0"/>
+          <a:chOff x="0" y="0"/>
+          <a:chExt cx="0" cy="0"/>
+        </a:xfrm>
+      </p:grpSpPr>
+      <p:sp>
+        <p:nvSpPr>
+          <p:cNvPr id="2" name="Title 1">
+            <a:extLst>
+              <a:ext uri="{FF2B5EF4-FFF2-40B4-BE49-F238E27FC236}">
+                <a16:creationId xmlns:a16="http://schemas.microsoft.com/office/drawing/2014/main" id="{7E34E7F9-C762-1EC7-C604-19DE63570D31}"/>
+              </a:ext>
+            </a:extLst>
+          </p:cNvPr>
+          <p:cNvSpPr>
+            <a:spLocks noGrp="1"/>
+          </p:cNvSpPr>
+          <p:nvPr>
+            <p:ph type="title"/>
+          </p:nvPr>
+        </p:nvSpPr>
+        <p:spPr/>
+        <p:txBody>
+          <a:bodyPr>
+            <a:normAutofit fontScale="90000"/>
+          </a:bodyPr>
+          <a:lstStyle/>
+          <a:p>
+            <a:r>
+              <a:rPr lang="en-US" dirty="0"/>
+              <a:t>Use case 4: Add a copy of Book</a:t>
+            </a:r>
+          </a:p>
+        </p:txBody>
+      </p:sp>
+      <p:pic>
+        <p:nvPicPr>
+          <p:cNvPr id="13" name="Content Placeholder 12" descr="A diagram of a book&#10;&#10;Description automatically generated">
+            <a:extLst>
+              <a:ext uri="{FF2B5EF4-FFF2-40B4-BE49-F238E27FC236}">
+                <a16:creationId xmlns:a16="http://schemas.microsoft.com/office/drawing/2014/main" id="{CA5ECB4F-C8E4-BF9B-13E9-3D49425563DB}"/>
+              </a:ext>
+            </a:extLst>
+          </p:cNvPr>
+          <p:cNvPicPr>
+            <a:picLocks noGrp="1" noChangeAspect="1"/>
+          </p:cNvPicPr>
+          <p:nvPr>
+            <p:ph idx="1"/>
+          </p:nvPr>
+        </p:nvPicPr>
+        <p:blipFill>
+          <a:blip r:embed="rId2"/>
+          <a:stretch>
+            <a:fillRect/>
+          </a:stretch>
+        </p:blipFill>
+        <p:spPr>
+          <a:xfrm>
+            <a:off x="3406257" y="2585711"/>
+            <a:ext cx="5379485" cy="4256296"/>
+          </a:xfrm>
+        </p:spPr>
+      </p:pic>
+    </p:spTree>
+    <p:extLst>
+      <p:ext uri="{BB962C8B-B14F-4D97-AF65-F5344CB8AC3E}">
+        <p14:creationId xmlns:p14="http://schemas.microsoft.com/office/powerpoint/2010/main" val="2538790425"/>
+      </p:ext>
+    </p:extLst>
+  </p:cSld>
+  <p:clrMapOvr>
+    <a:masterClrMapping/>
+  </p:clrMapOvr>
+</p:sld>
+</file>
+
+<file path=ppt/slides/slide8.xml><?xml version="1.0" encoding="utf-8"?>
+<p:sld xmlns:a="http://schemas.openxmlformats.org/drawingml/2006/main" xmlns:r="http://schemas.openxmlformats.org/officeDocument/2006/relationships" xmlns:p="http://schemas.openxmlformats.org/presentationml/2006/main">
+  <p:cSld>
+    <p:bg>
+      <p:bgPr>
+        <a:solidFill>
+          <a:schemeClr val="bg1"/>
+        </a:solidFill>
+        <a:effectLst/>
+      </p:bgPr>
+    </p:bg>
+    <p:spTree>
+      <p:nvGrpSpPr>
+        <p:cNvPr id="1" name=""/>
+        <p:cNvGrpSpPr/>
+        <p:nvPr/>
+      </p:nvGrpSpPr>
+      <p:grpSpPr>
+        <a:xfrm>
+          <a:off x="0" y="0"/>
+          <a:ext cx="0" cy="0"/>
+          <a:chOff x="0" y="0"/>
+          <a:chExt cx="0" cy="0"/>
+        </a:xfrm>
+      </p:grpSpPr>
+      <p:sp>
+        <p:nvSpPr>
+          <p:cNvPr id="8" name="Rectangle 7">
+            <a:extLst>
+              <a:ext uri="{FF2B5EF4-FFF2-40B4-BE49-F238E27FC236}">
+                <a16:creationId xmlns:a16="http://schemas.microsoft.com/office/drawing/2014/main" id="{09A1C012-8297-4361-ACE8-A2509FB18911}"/>
+              </a:ext>
+              <a:ext uri="{C183D7F6-B498-43B3-948B-1728B52AA6E4}">
+                <adec:decorative xmlns:adec="http://schemas.microsoft.com/office/drawing/2017/decorative" val="1"/>
+              </a:ext>
+            </a:extLst>
+          </p:cNvPr>
+          <p:cNvSpPr>
+            <a:spLocks noGrp="1" noRot="1" noChangeAspect="1" noMove="1" noResize="1" noEditPoints="1" noAdjustHandles="1" noChangeArrowheads="1" noChangeShapeType="1" noTextEdit="1"/>
+          </p:cNvSpPr>
+          <p:nvPr>
+            <p:extLst>
+              <p:ext uri="{386F3935-93C4-4BCD-93E2-E3B085C9AB24}">
+                <p16:designElem xmlns:p16="http://schemas.microsoft.com/office/powerpoint/2015/main" val="1"/>
+              </p:ext>
+            </p:extLst>
+          </p:nvPr>
+        </p:nvSpPr>
+        <p:spPr>
+          <a:xfrm>
+            <a:off x="0" y="4206240"/>
+            <a:ext cx="12192000" cy="2651760"/>
+          </a:xfrm>
+          <a:prstGeom prst="rect">
+            <a:avLst/>
+          </a:prstGeom>
+          <a:solidFill>
+            <a:schemeClr val="tx1"/>
+          </a:solidFill>
+          <a:ln>
+            <a:noFill/>
+          </a:ln>
+        </p:spPr>
+        <p:style>
+          <a:lnRef idx="2">
+            <a:schemeClr val="accent1">
+              <a:shade val="50000"/>
+            </a:schemeClr>
+          </a:lnRef>
+          <a:fillRef idx="1">
+            <a:schemeClr val="accent1"/>
+          </a:fillRef>
+          <a:effectRef idx="0">
+            <a:schemeClr val="accent1"/>
+          </a:effectRef>
+          <a:fontRef idx="minor">
+            <a:schemeClr val="lt1"/>
+          </a:fontRef>
+        </p:style>
+        <p:txBody>
+          <a:bodyPr rtlCol="0" anchor="ctr"/>
+          <a:lstStyle/>
+          <a:p>
+            <a:pPr algn="ctr"/>
+            <a:endParaRPr lang="en-US"/>
+          </a:p>
+        </p:txBody>
+      </p:sp>
+      <p:sp useBgFill="1">
+        <p:nvSpPr>
+          <p:cNvPr id="10" name="Rectangle 9">
+            <a:extLst>
+              <a:ext uri="{FF2B5EF4-FFF2-40B4-BE49-F238E27FC236}">
+                <a16:creationId xmlns:a16="http://schemas.microsoft.com/office/drawing/2014/main" id="{4AA13AD3-0A4F-475A-BEBB-DEEFF5C096C3}"/>
+              </a:ext>
+              <a:ext uri="{C183D7F6-B498-43B3-948B-1728B52AA6E4}">
+                <adec:decorative xmlns:adec="http://schemas.microsoft.com/office/drawing/2017/decorative" val="1"/>
+              </a:ext>
+            </a:extLst>
+          </p:cNvPr>
+          <p:cNvSpPr>
+            <a:spLocks noGrp="1" noRot="1" noChangeAspect="1" noMove="1" noResize="1" noEditPoints="1" noAdjustHandles="1" noChangeArrowheads="1" noChangeShapeType="1" noTextEdit="1"/>
+          </p:cNvSpPr>
+          <p:nvPr>
+            <p:extLst>
+              <p:ext uri="{386F3935-93C4-4BCD-93E2-E3B085C9AB24}">
+                <p16:designElem xmlns:p16="http://schemas.microsoft.com/office/powerpoint/2015/main" val="1"/>
+              </p:ext>
+            </p:extLst>
+          </p:nvPr>
+        </p:nvSpPr>
+        <p:spPr>
+          <a:xfrm>
+            <a:off x="0" y="0"/>
+            <a:ext cx="12192000" cy="6858000"/>
+          </a:xfrm>
+          <a:prstGeom prst="rect">
+            <a:avLst/>
+          </a:prstGeom>
+          <a:ln>
+            <a:noFill/>
+          </a:ln>
+        </p:spPr>
+        <p:style>
+          <a:lnRef idx="2">
+            <a:schemeClr val="accent1">
+              <a:shade val="50000"/>
+            </a:schemeClr>
+          </a:lnRef>
+          <a:fillRef idx="1">
+            <a:schemeClr val="accent1"/>
+          </a:fillRef>
+          <a:effectRef idx="0">
+            <a:schemeClr val="accent1"/>
+          </a:effectRef>
+          <a:fontRef idx="minor">
+            <a:schemeClr val="lt1"/>
+          </a:fontRef>
+        </p:style>
+        <p:txBody>
+          <a:bodyPr rtlCol="0" anchor="ctr"/>
+          <a:lstStyle/>
+          <a:p>
+            <a:pPr algn="ctr"/>
+            <a:endParaRPr lang="en-US"/>
+          </a:p>
+        </p:txBody>
+      </p:sp>
+      <p:sp>
+        <p:nvSpPr>
+          <p:cNvPr id="12" name="Rectangle 11">
             <a:extLst>
               <a:ext uri="{FF2B5EF4-FFF2-40B4-BE49-F238E27FC236}">
                 <a16:creationId xmlns:a16="http://schemas.microsoft.com/office/drawing/2014/main" id="{205BB74C-33FB-4335-8808-49E247F7BF75}"/>
@@ -3856,15 +5336,15 @@
           <p:cNvPr id="2" name="Title 1">
             <a:extLst>
               <a:ext uri="{FF2B5EF4-FFF2-40B4-BE49-F238E27FC236}">
-                <a16:creationId xmlns:a16="http://schemas.microsoft.com/office/drawing/2014/main" id="{20CB008E-DBD9-FAE0-F7CE-415EAA8F5BD4}"/>
-              </a:ext>
-            </a:extLst>
-          </p:cNvPr>
-          <p:cNvSpPr>
-            <a:spLocks noGrp="1"/>
-          </p:cNvSpPr>
-          <p:nvPr>
-            <p:ph type="ctrTitle"/>
+                <a16:creationId xmlns:a16="http://schemas.microsoft.com/office/drawing/2014/main" id="{DC3D7C04-6A62-EB96-EE6D-1A7D7B5AAD71}"/>
+              </a:ext>
+            </a:extLst>
+          </p:cNvPr>
+          <p:cNvSpPr>
+            <a:spLocks noGrp="1"/>
+          </p:cNvSpPr>
+          <p:nvPr>
+            <p:ph type="title"/>
           </p:nvPr>
         </p:nvSpPr>
         <p:spPr>
@@ -3874,118 +5354,24 @@
           </a:xfrm>
         </p:spPr>
         <p:txBody>
-          <a:bodyPr>
+          <a:bodyPr vert="horz" lIns="91440" tIns="45720" rIns="91440" bIns="45720" rtlCol="0" anchor="b">
             <a:normAutofit/>
           </a:bodyPr>
           <a:lstStyle/>
           <a:p>
-            <a:pPr algn="l"/>
-            <a:r>
-              <a:rPr lang="en-US" sz="6200">
-                <a:solidFill>
-                  <a:schemeClr val="bg1"/>
-                </a:solidFill>
-              </a:rPr>
-              <a:t>MPP – Midterm project</a:t>
-            </a:r>
-            <a:br>
-              <a:rPr lang="en-US" sz="6200">
-                <a:solidFill>
-                  <a:schemeClr val="bg1"/>
-                </a:solidFill>
-              </a:rPr>
-            </a:br>
-            <a:r>
-              <a:rPr lang="en-US" sz="6200">
-                <a:solidFill>
-                  <a:schemeClr val="bg1"/>
-                </a:solidFill>
-              </a:rPr>
-              <a:t>Library system</a:t>
-            </a:r>
-          </a:p>
-        </p:txBody>
-      </p:sp>
-      <p:sp>
-        <p:nvSpPr>
-          <p:cNvPr id="3" name="Subtitle 2">
-            <a:extLst>
-              <a:ext uri="{FF2B5EF4-FFF2-40B4-BE49-F238E27FC236}">
-                <a16:creationId xmlns:a16="http://schemas.microsoft.com/office/drawing/2014/main" id="{BC98E930-6228-3950-EEE2-D0C4CB6DD0A4}"/>
-              </a:ext>
-            </a:extLst>
-          </p:cNvPr>
-          <p:cNvSpPr>
-            <a:spLocks noGrp="1"/>
-          </p:cNvSpPr>
-          <p:nvPr>
-            <p:ph type="subTitle" idx="1"/>
-          </p:nvPr>
-        </p:nvSpPr>
-        <p:spPr>
-          <a:xfrm>
-            <a:off x="4703402" y="5206246"/>
-            <a:ext cx="6433990" cy="1024128"/>
-          </a:xfrm>
-        </p:spPr>
-        <p:txBody>
-          <a:bodyPr>
-            <a:normAutofit/>
-          </a:bodyPr>
-          <a:lstStyle/>
-          <a:p>
-            <a:pPr algn="l">
-              <a:lnSpc>
-                <a:spcPct val="91000"/>
-              </a:lnSpc>
-            </a:pPr>
-            <a:r>
-              <a:rPr lang="en-US" sz="1200">
-                <a:solidFill>
-                  <a:schemeClr val="tx1"/>
-                </a:solidFill>
-              </a:rPr>
-              <a:t>Group 1: </a:t>
-            </a:r>
-          </a:p>
-          <a:p>
-            <a:pPr algn="l">
-              <a:lnSpc>
-                <a:spcPct val="91000"/>
-              </a:lnSpc>
-            </a:pPr>
-            <a:r>
-              <a:rPr lang="en-US" sz="1200">
-                <a:solidFill>
-                  <a:schemeClr val="tx1"/>
-                </a:solidFill>
-              </a:rPr>
-              <a:t>Huynh Anh Vu Nguyen (Cris)</a:t>
-            </a:r>
-          </a:p>
-          <a:p>
-            <a:pPr algn="l">
-              <a:lnSpc>
-                <a:spcPct val="91000"/>
-              </a:lnSpc>
-            </a:pPr>
-            <a:r>
-              <a:rPr lang="en-US" sz="1200">
-                <a:solidFill>
-                  <a:schemeClr val="tx1"/>
-                </a:solidFill>
-              </a:rPr>
-              <a:t>Anh Tuan Ha</a:t>
+            <a:r>
+              <a:rPr lang="en-US" sz="7500"/>
+              <a:t>Thank you for your time!</a:t>
             </a:r>
           </a:p>
         </p:txBody>
       </p:sp>
       <p:pic>
         <p:nvPicPr>
-          <p:cNvPr id="4" name="Picture 3">
-            <a:extLst>
-              <a:ext uri="{FF2B5EF4-FFF2-40B4-BE49-F238E27FC236}">
-                <a16:creationId xmlns:a16="http://schemas.microsoft.com/office/drawing/2014/main" id="{B978FD2A-3BFF-6676-97E0-05C47EFDB981}"/>
+          <p:cNvPr id="4" name="Picture 3" descr="Top vide of a white alarm clock on a yellow and orange surface">
+            <a:extLst>
+              <a:ext uri="{FF2B5EF4-FFF2-40B4-BE49-F238E27FC236}">
+                <a16:creationId xmlns:a16="http://schemas.microsoft.com/office/drawing/2014/main" id="{8D134B65-D189-40B3-732C-4E1314B7B33D}"/>
               </a:ext>
             </a:extLst>
           </p:cNvPr>
@@ -3996,7 +5382,7 @@
         </p:nvPicPr>
         <p:blipFill rotWithShape="1">
           <a:blip r:embed="rId2"/>
-          <a:srcRect l="34" r="41570" b="3"/>
+          <a:srcRect l="11090" r="17654" b="-1"/>
           <a:stretch/>
         </p:blipFill>
         <p:spPr>
@@ -4012,515 +5398,105 @@
     </p:spTree>
     <p:extLst>
       <p:ext uri="{BB962C8B-B14F-4D97-AF65-F5344CB8AC3E}">
-        <p14:creationId xmlns:p14="http://schemas.microsoft.com/office/powerpoint/2010/main" val="957547278"/>
+        <p14:creationId xmlns:p14="http://schemas.microsoft.com/office/powerpoint/2010/main" val="2984354290"/>
       </p:ext>
     </p:extLst>
   </p:cSld>
   <p:clrMapOvr>
     <a:masterClrMapping/>
   </p:clrMapOvr>
-</p:sld>
-</file>
-
-<file path=ppt/slides/slide2.xml><?xml version="1.0" encoding="utf-8"?>
-<p:sld xmlns:a="http://schemas.openxmlformats.org/drawingml/2006/main" xmlns:r="http://schemas.openxmlformats.org/officeDocument/2006/relationships" xmlns:p="http://schemas.openxmlformats.org/presentationml/2006/main">
-  <p:cSld>
-    <p:spTree>
-      <p:nvGrpSpPr>
-        <p:cNvPr id="1" name=""/>
-        <p:cNvGrpSpPr/>
-        <p:nvPr/>
-      </p:nvGrpSpPr>
-      <p:grpSpPr>
-        <a:xfrm>
-          <a:off x="0" y="0"/>
-          <a:ext cx="0" cy="0"/>
-          <a:chOff x="0" y="0"/>
-          <a:chExt cx="0" cy="0"/>
-        </a:xfrm>
-      </p:grpSpPr>
-      <p:sp>
-        <p:nvSpPr>
-          <p:cNvPr id="2" name="Title 1">
-            <a:extLst>
-              <a:ext uri="{FF2B5EF4-FFF2-40B4-BE49-F238E27FC236}">
-                <a16:creationId xmlns:a16="http://schemas.microsoft.com/office/drawing/2014/main" id="{95A99755-67E8-150A-D27C-C211ED64DAF6}"/>
-              </a:ext>
-            </a:extLst>
-          </p:cNvPr>
-          <p:cNvSpPr>
-            <a:spLocks noGrp="1"/>
-          </p:cNvSpPr>
-          <p:nvPr>
-            <p:ph type="title"/>
-          </p:nvPr>
-        </p:nvSpPr>
-        <p:spPr/>
-        <p:txBody>
-          <a:bodyPr/>
-          <a:lstStyle/>
-          <a:p>
-            <a:r>
-              <a:rPr lang="en-US" dirty="0"/>
-              <a:t>Use case</a:t>
-            </a:r>
-          </a:p>
-        </p:txBody>
-      </p:sp>
-      <p:sp>
-        <p:nvSpPr>
-          <p:cNvPr id="3" name="Content Placeholder 2">
-            <a:extLst>
-              <a:ext uri="{FF2B5EF4-FFF2-40B4-BE49-F238E27FC236}">
-                <a16:creationId xmlns:a16="http://schemas.microsoft.com/office/drawing/2014/main" id="{D96C31EA-6B89-F94E-9773-04DF4842AF67}"/>
-              </a:ext>
-            </a:extLst>
-          </p:cNvPr>
-          <p:cNvSpPr>
-            <a:spLocks noGrp="1"/>
-          </p:cNvSpPr>
-          <p:nvPr>
-            <p:ph idx="1"/>
-          </p:nvPr>
-        </p:nvSpPr>
-        <p:spPr/>
-        <p:txBody>
-          <a:bodyPr/>
-          <a:lstStyle/>
-          <a:p>
-            <a:endParaRPr lang="en-US" dirty="0"/>
-          </a:p>
-        </p:txBody>
-      </p:sp>
-    </p:spTree>
-    <p:extLst>
-      <p:ext uri="{BB962C8B-B14F-4D97-AF65-F5344CB8AC3E}">
-        <p14:creationId xmlns:p14="http://schemas.microsoft.com/office/powerpoint/2010/main" val="3015970725"/>
-      </p:ext>
-    </p:extLst>
-  </p:cSld>
-  <p:clrMapOvr>
-    <a:masterClrMapping/>
-  </p:clrMapOvr>
-</p:sld>
-</file>
-
-<file path=ppt/slides/slide3.xml><?xml version="1.0" encoding="utf-8"?>
-<p:sld xmlns:a="http://schemas.openxmlformats.org/drawingml/2006/main" xmlns:r="http://schemas.openxmlformats.org/officeDocument/2006/relationships" xmlns:p="http://schemas.openxmlformats.org/presentationml/2006/main">
-  <p:cSld>
-    <p:spTree>
-      <p:nvGrpSpPr>
-        <p:cNvPr id="1" name=""/>
-        <p:cNvGrpSpPr/>
-        <p:nvPr/>
-      </p:nvGrpSpPr>
-      <p:grpSpPr>
-        <a:xfrm>
-          <a:off x="0" y="0"/>
-          <a:ext cx="0" cy="0"/>
-          <a:chOff x="0" y="0"/>
-          <a:chExt cx="0" cy="0"/>
-        </a:xfrm>
-      </p:grpSpPr>
-      <p:sp>
-        <p:nvSpPr>
-          <p:cNvPr id="2" name="Title 1">
-            <a:extLst>
-              <a:ext uri="{FF2B5EF4-FFF2-40B4-BE49-F238E27FC236}">
-                <a16:creationId xmlns:a16="http://schemas.microsoft.com/office/drawing/2014/main" id="{0FD934C0-26EA-C166-E3BC-E83D430682B4}"/>
-              </a:ext>
-            </a:extLst>
-          </p:cNvPr>
-          <p:cNvSpPr>
-            <a:spLocks noGrp="1"/>
-          </p:cNvSpPr>
-          <p:nvPr>
-            <p:ph type="title"/>
-          </p:nvPr>
-        </p:nvSpPr>
-        <p:spPr/>
-        <p:txBody>
-          <a:bodyPr/>
-          <a:lstStyle/>
-          <a:p>
-            <a:r>
-              <a:rPr lang="en-US" dirty="0"/>
-              <a:t>Class diagram</a:t>
-            </a:r>
-          </a:p>
-        </p:txBody>
-      </p:sp>
-      <p:sp>
-        <p:nvSpPr>
-          <p:cNvPr id="3" name="Content Placeholder 2">
-            <a:extLst>
-              <a:ext uri="{FF2B5EF4-FFF2-40B4-BE49-F238E27FC236}">
-                <a16:creationId xmlns:a16="http://schemas.microsoft.com/office/drawing/2014/main" id="{A96A8B52-E21C-8DF8-4037-F8F23D335350}"/>
-              </a:ext>
-            </a:extLst>
-          </p:cNvPr>
-          <p:cNvSpPr>
-            <a:spLocks noGrp="1"/>
-          </p:cNvSpPr>
-          <p:nvPr>
-            <p:ph idx="1"/>
-          </p:nvPr>
-        </p:nvSpPr>
-        <p:spPr/>
-        <p:txBody>
-          <a:bodyPr/>
-          <a:lstStyle/>
-          <a:p>
-            <a:endParaRPr lang="en-US"/>
-          </a:p>
-        </p:txBody>
-      </p:sp>
-    </p:spTree>
-    <p:extLst>
-      <p:ext uri="{BB962C8B-B14F-4D97-AF65-F5344CB8AC3E}">
-        <p14:creationId xmlns:p14="http://schemas.microsoft.com/office/powerpoint/2010/main" val="1233873893"/>
-      </p:ext>
-    </p:extLst>
-  </p:cSld>
-  <p:clrMapOvr>
-    <a:masterClrMapping/>
-  </p:clrMapOvr>
-</p:sld>
-</file>
-
-<file path=ppt/slides/slide4.xml><?xml version="1.0" encoding="utf-8"?>
-<p:sld xmlns:a="http://schemas.openxmlformats.org/drawingml/2006/main" xmlns:r="http://schemas.openxmlformats.org/officeDocument/2006/relationships" xmlns:p="http://schemas.openxmlformats.org/presentationml/2006/main">
-  <p:cSld>
-    <p:spTree>
-      <p:nvGrpSpPr>
-        <p:cNvPr id="1" name=""/>
-        <p:cNvGrpSpPr/>
-        <p:nvPr/>
-      </p:nvGrpSpPr>
-      <p:grpSpPr>
-        <a:xfrm>
-          <a:off x="0" y="0"/>
-          <a:ext cx="0" cy="0"/>
-          <a:chOff x="0" y="0"/>
-          <a:chExt cx="0" cy="0"/>
-        </a:xfrm>
-      </p:grpSpPr>
-      <p:sp>
-        <p:nvSpPr>
-          <p:cNvPr id="2" name="Title 1">
-            <a:extLst>
-              <a:ext uri="{FF2B5EF4-FFF2-40B4-BE49-F238E27FC236}">
-                <a16:creationId xmlns:a16="http://schemas.microsoft.com/office/drawing/2014/main" id="{D787894A-F558-299E-F24A-EAECD544CED1}"/>
-              </a:ext>
-            </a:extLst>
-          </p:cNvPr>
-          <p:cNvSpPr>
-            <a:spLocks noGrp="1"/>
-          </p:cNvSpPr>
-          <p:nvPr>
-            <p:ph type="title"/>
-          </p:nvPr>
-        </p:nvSpPr>
-        <p:spPr/>
-        <p:txBody>
-          <a:bodyPr/>
-          <a:lstStyle/>
-          <a:p>
-            <a:r>
-              <a:rPr lang="en-US" dirty="0"/>
-              <a:t>Use case 1: Login</a:t>
-            </a:r>
-          </a:p>
-        </p:txBody>
-      </p:sp>
-      <p:sp>
-        <p:nvSpPr>
-          <p:cNvPr id="3" name="Content Placeholder 2">
-            <a:extLst>
-              <a:ext uri="{FF2B5EF4-FFF2-40B4-BE49-F238E27FC236}">
-                <a16:creationId xmlns:a16="http://schemas.microsoft.com/office/drawing/2014/main" id="{99F7F57A-6D49-823F-174E-9877484631D8}"/>
-              </a:ext>
-            </a:extLst>
-          </p:cNvPr>
-          <p:cNvSpPr>
-            <a:spLocks noGrp="1"/>
-          </p:cNvSpPr>
-          <p:nvPr>
-            <p:ph idx="1"/>
-          </p:nvPr>
-        </p:nvSpPr>
-        <p:spPr/>
-        <p:txBody>
-          <a:bodyPr/>
-          <a:lstStyle/>
-          <a:p>
-            <a:endParaRPr lang="en-US" dirty="0"/>
-          </a:p>
-        </p:txBody>
-      </p:sp>
-    </p:spTree>
-    <p:extLst>
-      <p:ext uri="{BB962C8B-B14F-4D97-AF65-F5344CB8AC3E}">
-        <p14:creationId xmlns:p14="http://schemas.microsoft.com/office/powerpoint/2010/main" val="2479012229"/>
-      </p:ext>
-    </p:extLst>
-  </p:cSld>
-  <p:clrMapOvr>
-    <a:masterClrMapping/>
-  </p:clrMapOvr>
-</p:sld>
-</file>
-
-<file path=ppt/slides/slide5.xml><?xml version="1.0" encoding="utf-8"?>
-<p:sld xmlns:a="http://schemas.openxmlformats.org/drawingml/2006/main" xmlns:r="http://schemas.openxmlformats.org/officeDocument/2006/relationships" xmlns:p="http://schemas.openxmlformats.org/presentationml/2006/main">
-  <p:cSld>
-    <p:spTree>
-      <p:nvGrpSpPr>
-        <p:cNvPr id="1" name=""/>
-        <p:cNvGrpSpPr/>
-        <p:nvPr/>
-      </p:nvGrpSpPr>
-      <p:grpSpPr>
-        <a:xfrm>
-          <a:off x="0" y="0"/>
-          <a:ext cx="0" cy="0"/>
-          <a:chOff x="0" y="0"/>
-          <a:chExt cx="0" cy="0"/>
-        </a:xfrm>
-      </p:grpSpPr>
-      <p:sp>
-        <p:nvSpPr>
-          <p:cNvPr id="2" name="Title 1">
-            <a:extLst>
-              <a:ext uri="{FF2B5EF4-FFF2-40B4-BE49-F238E27FC236}">
-                <a16:creationId xmlns:a16="http://schemas.microsoft.com/office/drawing/2014/main" id="{D5472331-E046-83D8-BEDB-6FE11E6272D8}"/>
-              </a:ext>
-            </a:extLst>
-          </p:cNvPr>
-          <p:cNvSpPr>
-            <a:spLocks noGrp="1"/>
-          </p:cNvSpPr>
-          <p:nvPr>
-            <p:ph type="title"/>
-          </p:nvPr>
-        </p:nvSpPr>
-        <p:spPr/>
-        <p:txBody>
-          <a:bodyPr>
-            <a:normAutofit fontScale="90000"/>
-          </a:bodyPr>
-          <a:lstStyle/>
-          <a:p>
-            <a:r>
-              <a:rPr lang="en-US" dirty="0"/>
-              <a:t>User case 2: Add new library member</a:t>
-            </a:r>
-          </a:p>
-        </p:txBody>
-      </p:sp>
-      <p:sp>
-        <p:nvSpPr>
-          <p:cNvPr id="3" name="Content Placeholder 2">
-            <a:extLst>
-              <a:ext uri="{FF2B5EF4-FFF2-40B4-BE49-F238E27FC236}">
-                <a16:creationId xmlns:a16="http://schemas.microsoft.com/office/drawing/2014/main" id="{280E4B4E-4F89-1CE2-5DFB-E39341CAAB45}"/>
-              </a:ext>
-            </a:extLst>
-          </p:cNvPr>
-          <p:cNvSpPr>
-            <a:spLocks noGrp="1"/>
-          </p:cNvSpPr>
-          <p:nvPr>
-            <p:ph idx="1"/>
-          </p:nvPr>
-        </p:nvSpPr>
-        <p:spPr/>
-        <p:txBody>
-          <a:bodyPr/>
-          <a:lstStyle/>
-          <a:p>
-            <a:endParaRPr lang="en-US"/>
-          </a:p>
-        </p:txBody>
-      </p:sp>
-    </p:spTree>
-    <p:extLst>
-      <p:ext uri="{BB962C8B-B14F-4D97-AF65-F5344CB8AC3E}">
-        <p14:creationId xmlns:p14="http://schemas.microsoft.com/office/powerpoint/2010/main" val="3190030165"/>
-      </p:ext>
-    </p:extLst>
-  </p:cSld>
-  <p:clrMapOvr>
-    <a:masterClrMapping/>
-  </p:clrMapOvr>
-</p:sld>
-</file>
-
-<file path=ppt/slides/slide6.xml><?xml version="1.0" encoding="utf-8"?>
-<p:sld xmlns:a="http://schemas.openxmlformats.org/drawingml/2006/main" xmlns:r="http://schemas.openxmlformats.org/officeDocument/2006/relationships" xmlns:p="http://schemas.openxmlformats.org/presentationml/2006/main">
-  <p:cSld>
-    <p:spTree>
-      <p:nvGrpSpPr>
-        <p:cNvPr id="1" name=""/>
-        <p:cNvGrpSpPr/>
-        <p:nvPr/>
-      </p:nvGrpSpPr>
-      <p:grpSpPr>
-        <a:xfrm>
-          <a:off x="0" y="0"/>
-          <a:ext cx="0" cy="0"/>
-          <a:chOff x="0" y="0"/>
-          <a:chExt cx="0" cy="0"/>
-        </a:xfrm>
-      </p:grpSpPr>
-      <p:sp>
-        <p:nvSpPr>
-          <p:cNvPr id="2" name="Title 1">
-            <a:extLst>
-              <a:ext uri="{FF2B5EF4-FFF2-40B4-BE49-F238E27FC236}">
-                <a16:creationId xmlns:a16="http://schemas.microsoft.com/office/drawing/2014/main" id="{456E714B-A709-2DD6-056B-FE9B0C9017DF}"/>
-              </a:ext>
-            </a:extLst>
-          </p:cNvPr>
-          <p:cNvSpPr>
-            <a:spLocks noGrp="1"/>
-          </p:cNvSpPr>
-          <p:nvPr>
-            <p:ph type="title"/>
-          </p:nvPr>
-        </p:nvSpPr>
-        <p:spPr/>
-        <p:txBody>
-          <a:bodyPr/>
-          <a:lstStyle/>
-          <a:p>
-            <a:r>
-              <a:rPr lang="en-US" dirty="0"/>
-              <a:t>Use case 3: check out</a:t>
-            </a:r>
-          </a:p>
-        </p:txBody>
-      </p:sp>
-      <p:sp>
-        <p:nvSpPr>
-          <p:cNvPr id="3" name="Content Placeholder 2">
-            <a:extLst>
-              <a:ext uri="{FF2B5EF4-FFF2-40B4-BE49-F238E27FC236}">
-                <a16:creationId xmlns:a16="http://schemas.microsoft.com/office/drawing/2014/main" id="{A3C849C7-8378-3A98-9798-15AFCC565C91}"/>
-              </a:ext>
-            </a:extLst>
-          </p:cNvPr>
-          <p:cNvSpPr>
-            <a:spLocks noGrp="1"/>
-          </p:cNvSpPr>
-          <p:nvPr>
-            <p:ph idx="1"/>
-          </p:nvPr>
-        </p:nvSpPr>
-        <p:spPr/>
-        <p:txBody>
-          <a:bodyPr/>
-          <a:lstStyle/>
-          <a:p>
-            <a:endParaRPr lang="en-US"/>
-          </a:p>
-        </p:txBody>
-      </p:sp>
-    </p:spTree>
-    <p:extLst>
-      <p:ext uri="{BB962C8B-B14F-4D97-AF65-F5344CB8AC3E}">
-        <p14:creationId xmlns:p14="http://schemas.microsoft.com/office/powerpoint/2010/main" val="4056876501"/>
-      </p:ext>
-    </p:extLst>
-  </p:cSld>
-  <p:clrMapOvr>
-    <a:masterClrMapping/>
-  </p:clrMapOvr>
-</p:sld>
-</file>
-
-<file path=ppt/slides/slide7.xml><?xml version="1.0" encoding="utf-8"?>
-<p:sld xmlns:a="http://schemas.openxmlformats.org/drawingml/2006/main" xmlns:r="http://schemas.openxmlformats.org/officeDocument/2006/relationships" xmlns:p="http://schemas.openxmlformats.org/presentationml/2006/main">
-  <p:cSld>
-    <p:spTree>
-      <p:nvGrpSpPr>
-        <p:cNvPr id="1" name=""/>
-        <p:cNvGrpSpPr/>
-        <p:nvPr/>
-      </p:nvGrpSpPr>
-      <p:grpSpPr>
-        <a:xfrm>
-          <a:off x="0" y="0"/>
-          <a:ext cx="0" cy="0"/>
-          <a:chOff x="0" y="0"/>
-          <a:chExt cx="0" cy="0"/>
-        </a:xfrm>
-      </p:grpSpPr>
-      <p:sp>
-        <p:nvSpPr>
-          <p:cNvPr id="2" name="Title 1">
-            <a:extLst>
-              <a:ext uri="{FF2B5EF4-FFF2-40B4-BE49-F238E27FC236}">
-                <a16:creationId xmlns:a16="http://schemas.microsoft.com/office/drawing/2014/main" id="{7E34E7F9-C762-1EC7-C604-19DE63570D31}"/>
-              </a:ext>
-            </a:extLst>
-          </p:cNvPr>
-          <p:cNvSpPr>
-            <a:spLocks noGrp="1"/>
-          </p:cNvSpPr>
-          <p:nvPr>
-            <p:ph type="title"/>
-          </p:nvPr>
-        </p:nvSpPr>
-        <p:spPr/>
-        <p:txBody>
-          <a:bodyPr>
-            <a:normAutofit fontScale="90000"/>
-          </a:bodyPr>
-          <a:lstStyle/>
-          <a:p>
-            <a:r>
-              <a:rPr lang="en-US" dirty="0"/>
-              <a:t>Use case 4: Add a copy of Book</a:t>
-            </a:r>
-          </a:p>
-        </p:txBody>
-      </p:sp>
-      <p:sp>
-        <p:nvSpPr>
-          <p:cNvPr id="3" name="Content Placeholder 2">
-            <a:extLst>
-              <a:ext uri="{FF2B5EF4-FFF2-40B4-BE49-F238E27FC236}">
-                <a16:creationId xmlns:a16="http://schemas.microsoft.com/office/drawing/2014/main" id="{C06B9606-1830-5AE0-8579-7AEA40FA0073}"/>
-              </a:ext>
-            </a:extLst>
-          </p:cNvPr>
-          <p:cNvSpPr>
-            <a:spLocks noGrp="1"/>
-          </p:cNvSpPr>
-          <p:nvPr>
-            <p:ph idx="1"/>
-          </p:nvPr>
-        </p:nvSpPr>
-        <p:spPr/>
-        <p:txBody>
-          <a:bodyPr/>
-          <a:lstStyle/>
-          <a:p>
-            <a:endParaRPr lang="en-US"/>
-          </a:p>
-        </p:txBody>
-      </p:sp>
-    </p:spTree>
-    <p:extLst>
-      <p:ext uri="{BB962C8B-B14F-4D97-AF65-F5344CB8AC3E}">
-        <p14:creationId xmlns:p14="http://schemas.microsoft.com/office/powerpoint/2010/main" val="2538790425"/>
-      </p:ext>
-    </p:extLst>
-  </p:cSld>
-  <p:clrMapOvr>
-    <a:masterClrMapping/>
-  </p:clrMapOvr>
+  <p:timing>
+    <p:tnLst>
+      <p:par>
+        <p:cTn id="1" dur="indefinite" restart="never" nodeType="tmRoot">
+          <p:childTnLst>
+            <p:seq concurrent="1" nextAc="seek">
+              <p:cTn id="2" dur="indefinite" nodeType="mainSeq">
+                <p:childTnLst>
+                  <p:par>
+                    <p:cTn id="3" fill="hold">
+                      <p:stCondLst>
+                        <p:cond delay="indefinite"/>
+                        <p:cond evt="onBegin" delay="0">
+                          <p:tn val="2"/>
+                        </p:cond>
+                      </p:stCondLst>
+                      <p:childTnLst>
+                        <p:par>
+                          <p:cTn id="4" fill="hold">
+                            <p:stCondLst>
+                              <p:cond delay="0"/>
+                            </p:stCondLst>
+                            <p:childTnLst>
+                              <p:par>
+                                <p:cTn id="5" presetID="10" presetClass="entr" presetSubtype="0" fill="hold" grpId="0" nodeType="withEffect">
+                                  <p:stCondLst>
+                                    <p:cond delay="1000"/>
+                                  </p:stCondLst>
+                                  <p:iterate>
+                                    <p:tmPct val="10000"/>
+                                  </p:iterate>
+                                  <p:childTnLst>
+                                    <p:set>
+                                      <p:cBhvr>
+                                        <p:cTn id="6" dur="1" fill="hold">
+                                          <p:stCondLst>
+                                            <p:cond delay="0"/>
+                                          </p:stCondLst>
+                                        </p:cTn>
+                                        <p:tgtEl>
+                                          <p:spTgt spid="2"/>
+                                        </p:tgtEl>
+                                        <p:attrNameLst>
+                                          <p:attrName>style.visibility</p:attrName>
+                                        </p:attrNameLst>
+                                      </p:cBhvr>
+                                      <p:to>
+                                        <p:strVal val="visible"/>
+                                      </p:to>
+                                    </p:set>
+                                    <p:animEffect transition="in" filter="fade">
+                                      <p:cBhvr>
+                                        <p:cTn id="7" dur="700"/>
+                                        <p:tgtEl>
+                                          <p:spTgt spid="2"/>
+                                        </p:tgtEl>
+                                      </p:cBhvr>
+                                    </p:animEffect>
+                                  </p:childTnLst>
+                                </p:cTn>
+                              </p:par>
+                            </p:childTnLst>
+                          </p:cTn>
+                        </p:par>
+                      </p:childTnLst>
+                    </p:cTn>
+                  </p:par>
+                </p:childTnLst>
+              </p:cTn>
+              <p:prevCondLst>
+                <p:cond evt="onPrev" delay="0">
+                  <p:tgtEl>
+                    <p:sldTgt/>
+                  </p:tgtEl>
+                </p:cond>
+              </p:prevCondLst>
+              <p:nextCondLst>
+                <p:cond evt="onNext" delay="0">
+                  <p:tgtEl>
+                    <p:sldTgt/>
+                  </p:tgtEl>
+                </p:cond>
+              </p:nextCondLst>
+            </p:seq>
+          </p:childTnLst>
+        </p:cTn>
+      </p:par>
+    </p:tnLst>
+    <p:bldLst>
+      <p:bldP spid="2" grpId="0"/>
+    </p:bldLst>
+  </p:timing>
 </p:sld>
 </file>
 

</xml_diff>